<commit_message>
Add new BriefCASE workflow figure
</commit_message>
<xml_diff>
--- a/paper/figs/workflow.pptx
+++ b/paper/figs/workflow.pptx
@@ -6,6 +6,7 @@
   </p:sldMasterIdLst>
   <p:sldIdLst>
     <p:sldId id="258" r:id="rId2"/>
+    <p:sldId id="259" r:id="rId3"/>
   </p:sldIdLst>
   <p:sldSz cx="12192000" cy="6858000"/>
   <p:notesSz cx="6858000" cy="9144000"/>
@@ -259,7 +260,7 @@
           <a:p>
             <a:fld id="{F11C6F8B-160A-4147-B7E2-F2783ACD33C4}" type="datetimeFigureOut">
               <a:rPr lang="en-US" smtClean="0"/>
-              <a:t>12/5/22</a:t>
+              <a:t>12/8/22</a:t>
             </a:fld>
             <a:endParaRPr lang="en-US"/>
           </a:p>
@@ -457,7 +458,7 @@
           <a:p>
             <a:fld id="{F11C6F8B-160A-4147-B7E2-F2783ACD33C4}" type="datetimeFigureOut">
               <a:rPr lang="en-US" smtClean="0"/>
-              <a:t>12/5/22</a:t>
+              <a:t>12/8/22</a:t>
             </a:fld>
             <a:endParaRPr lang="en-US"/>
           </a:p>
@@ -665,7 +666,7 @@
           <a:p>
             <a:fld id="{F11C6F8B-160A-4147-B7E2-F2783ACD33C4}" type="datetimeFigureOut">
               <a:rPr lang="en-US" smtClean="0"/>
-              <a:t>12/5/22</a:t>
+              <a:t>12/8/22</a:t>
             </a:fld>
             <a:endParaRPr lang="en-US"/>
           </a:p>
@@ -863,7 +864,7 @@
           <a:p>
             <a:fld id="{F11C6F8B-160A-4147-B7E2-F2783ACD33C4}" type="datetimeFigureOut">
               <a:rPr lang="en-US" smtClean="0"/>
-              <a:t>12/5/22</a:t>
+              <a:t>12/8/22</a:t>
             </a:fld>
             <a:endParaRPr lang="en-US"/>
           </a:p>
@@ -1138,7 +1139,7 @@
           <a:p>
             <a:fld id="{F11C6F8B-160A-4147-B7E2-F2783ACD33C4}" type="datetimeFigureOut">
               <a:rPr lang="en-US" smtClean="0"/>
-              <a:t>12/5/22</a:t>
+              <a:t>12/8/22</a:t>
             </a:fld>
             <a:endParaRPr lang="en-US"/>
           </a:p>
@@ -1403,7 +1404,7 @@
           <a:p>
             <a:fld id="{F11C6F8B-160A-4147-B7E2-F2783ACD33C4}" type="datetimeFigureOut">
               <a:rPr lang="en-US" smtClean="0"/>
-              <a:t>12/5/22</a:t>
+              <a:t>12/8/22</a:t>
             </a:fld>
             <a:endParaRPr lang="en-US"/>
           </a:p>
@@ -1815,7 +1816,7 @@
           <a:p>
             <a:fld id="{F11C6F8B-160A-4147-B7E2-F2783ACD33C4}" type="datetimeFigureOut">
               <a:rPr lang="en-US" smtClean="0"/>
-              <a:t>12/5/22</a:t>
+              <a:t>12/8/22</a:t>
             </a:fld>
             <a:endParaRPr lang="en-US"/>
           </a:p>
@@ -1956,7 +1957,7 @@
           <a:p>
             <a:fld id="{F11C6F8B-160A-4147-B7E2-F2783ACD33C4}" type="datetimeFigureOut">
               <a:rPr lang="en-US" smtClean="0"/>
-              <a:t>12/5/22</a:t>
+              <a:t>12/8/22</a:t>
             </a:fld>
             <a:endParaRPr lang="en-US"/>
           </a:p>
@@ -2069,7 +2070,7 @@
           <a:p>
             <a:fld id="{F11C6F8B-160A-4147-B7E2-F2783ACD33C4}" type="datetimeFigureOut">
               <a:rPr lang="en-US" smtClean="0"/>
-              <a:t>12/5/22</a:t>
+              <a:t>12/8/22</a:t>
             </a:fld>
             <a:endParaRPr lang="en-US"/>
           </a:p>
@@ -2380,7 +2381,7 @@
           <a:p>
             <a:fld id="{F11C6F8B-160A-4147-B7E2-F2783ACD33C4}" type="datetimeFigureOut">
               <a:rPr lang="en-US" smtClean="0"/>
-              <a:t>12/5/22</a:t>
+              <a:t>12/8/22</a:t>
             </a:fld>
             <a:endParaRPr lang="en-US"/>
           </a:p>
@@ -2668,7 +2669,7 @@
           <a:p>
             <a:fld id="{F11C6F8B-160A-4147-B7E2-F2783ACD33C4}" type="datetimeFigureOut">
               <a:rPr lang="en-US" smtClean="0"/>
-              <a:t>12/5/22</a:t>
+              <a:t>12/8/22</a:t>
             </a:fld>
             <a:endParaRPr lang="en-US"/>
           </a:p>
@@ -2909,7 +2910,7 @@
           <a:p>
             <a:fld id="{F11C6F8B-160A-4147-B7E2-F2783ACD33C4}" type="datetimeFigureOut">
               <a:rPr lang="en-US" smtClean="0"/>
-              <a:t>12/5/22</a:t>
+              <a:t>12/8/22</a:t>
             </a:fld>
             <a:endParaRPr lang="en-US"/>
           </a:p>
@@ -3328,6 +3329,1343 @@
       </p:grpSpPr>
       <p:sp>
         <p:nvSpPr>
+          <p:cNvPr id="2" name="Rounded Rectangle 1">
+            <a:extLst>
+              <a:ext uri="{FF2B5EF4-FFF2-40B4-BE49-F238E27FC236}">
+                <a16:creationId xmlns:a16="http://schemas.microsoft.com/office/drawing/2014/main" id="{AE158976-A0DA-233E-6328-DCF1D637ED6D}"/>
+              </a:ext>
+            </a:extLst>
+          </p:cNvPr>
+          <p:cNvSpPr/>
+          <p:nvPr/>
+        </p:nvSpPr>
+        <p:spPr>
+          <a:xfrm>
+            <a:off x="166274" y="1570379"/>
+            <a:ext cx="1772478" cy="919368"/>
+          </a:xfrm>
+          <a:prstGeom prst="roundRect">
+            <a:avLst/>
+          </a:prstGeom>
+          <a:ln w="38100">
+            <a:solidFill>
+              <a:schemeClr val="tx1"/>
+            </a:solidFill>
+          </a:ln>
+        </p:spPr>
+        <p:style>
+          <a:lnRef idx="2">
+            <a:schemeClr val="accent1"/>
+          </a:lnRef>
+          <a:fillRef idx="1">
+            <a:schemeClr val="lt1"/>
+          </a:fillRef>
+          <a:effectRef idx="0">
+            <a:schemeClr val="accent1"/>
+          </a:effectRef>
+          <a:fontRef idx="minor">
+            <a:schemeClr val="dk1"/>
+          </a:fontRef>
+        </p:style>
+        <p:txBody>
+          <a:bodyPr rtlCol="0" anchor="ctr"/>
+          <a:lstStyle/>
+          <a:p>
+            <a:pPr algn="ctr"/>
+            <a:r>
+              <a:rPr lang="en-US" dirty="0"/>
+              <a:t>System</a:t>
+            </a:r>
+          </a:p>
+          <a:p>
+            <a:pPr algn="ctr"/>
+            <a:r>
+              <a:rPr lang="en-US" dirty="0">
+                <a:solidFill>
+                  <a:schemeClr val="tx2"/>
+                </a:solidFill>
+              </a:rPr>
+              <a:t>Contract</a:t>
+            </a:r>
+          </a:p>
+          <a:p>
+            <a:pPr algn="ctr"/>
+            <a:r>
+              <a:rPr lang="en-US" dirty="0">
+                <a:solidFill>
+                  <a:schemeClr val="tx2"/>
+                </a:solidFill>
+              </a:rPr>
+              <a:t>Implementation</a:t>
+            </a:r>
+          </a:p>
+        </p:txBody>
+      </p:sp>
+      <p:sp>
+        <p:nvSpPr>
+          <p:cNvPr id="4" name="Rounded Rectangle 3">
+            <a:extLst>
+              <a:ext uri="{FF2B5EF4-FFF2-40B4-BE49-F238E27FC236}">
+                <a16:creationId xmlns:a16="http://schemas.microsoft.com/office/drawing/2014/main" id="{1F29FAE7-557E-D00C-A4D2-37F10287D4BC}"/>
+              </a:ext>
+            </a:extLst>
+          </p:cNvPr>
+          <p:cNvSpPr/>
+          <p:nvPr/>
+        </p:nvSpPr>
+        <p:spPr>
+          <a:xfrm>
+            <a:off x="3538122" y="1567935"/>
+            <a:ext cx="1772478" cy="919368"/>
+          </a:xfrm>
+          <a:prstGeom prst="roundRect">
+            <a:avLst/>
+          </a:prstGeom>
+          <a:ln w="38100">
+            <a:solidFill>
+              <a:schemeClr val="tx1"/>
+            </a:solidFill>
+          </a:ln>
+        </p:spPr>
+        <p:style>
+          <a:lnRef idx="2">
+            <a:schemeClr val="accent1"/>
+          </a:lnRef>
+          <a:fillRef idx="1">
+            <a:schemeClr val="lt1"/>
+          </a:fillRef>
+          <a:effectRef idx="0">
+            <a:schemeClr val="accent1"/>
+          </a:effectRef>
+          <a:fontRef idx="minor">
+            <a:schemeClr val="dk1"/>
+          </a:fontRef>
+        </p:style>
+        <p:txBody>
+          <a:bodyPr rtlCol="0" anchor="ctr"/>
+          <a:lstStyle/>
+          <a:p>
+            <a:pPr algn="ctr"/>
+            <a:r>
+              <a:rPr lang="en-US" dirty="0"/>
+              <a:t>Threat Analysis</a:t>
+            </a:r>
+          </a:p>
+          <a:p>
+            <a:pPr algn="ctr"/>
+            <a:r>
+              <a:rPr lang="en-US" dirty="0">
+                <a:solidFill>
+                  <a:schemeClr val="tx2"/>
+                </a:solidFill>
+              </a:rPr>
+              <a:t>Cyber Requirements</a:t>
+            </a:r>
+          </a:p>
+        </p:txBody>
+      </p:sp>
+      <p:sp>
+        <p:nvSpPr>
+          <p:cNvPr id="5" name="Rectangle 4">
+            <a:extLst>
+              <a:ext uri="{FF2B5EF4-FFF2-40B4-BE49-F238E27FC236}">
+                <a16:creationId xmlns:a16="http://schemas.microsoft.com/office/drawing/2014/main" id="{7637169E-BB95-4266-2862-074BB10BBDB4}"/>
+              </a:ext>
+            </a:extLst>
+          </p:cNvPr>
+          <p:cNvSpPr/>
+          <p:nvPr/>
+        </p:nvSpPr>
+        <p:spPr>
+          <a:xfrm>
+            <a:off x="862677" y="2953265"/>
+            <a:ext cx="1759852" cy="993913"/>
+          </a:xfrm>
+          <a:prstGeom prst="rect">
+            <a:avLst/>
+          </a:prstGeom>
+          <a:ln w="38100"/>
+        </p:spPr>
+        <p:style>
+          <a:lnRef idx="2">
+            <a:schemeClr val="dk1"/>
+          </a:lnRef>
+          <a:fillRef idx="1">
+            <a:schemeClr val="lt1"/>
+          </a:fillRef>
+          <a:effectRef idx="0">
+            <a:schemeClr val="dk1"/>
+          </a:effectRef>
+          <a:fontRef idx="minor">
+            <a:schemeClr val="dk1"/>
+          </a:fontRef>
+        </p:style>
+        <p:txBody>
+          <a:bodyPr rtlCol="0" anchor="ctr"/>
+          <a:lstStyle/>
+          <a:p>
+            <a:pPr algn="ctr"/>
+            <a:r>
+              <a:rPr lang="en-US" dirty="0"/>
+              <a:t>AGREE Verification Engine</a:t>
+            </a:r>
+          </a:p>
+        </p:txBody>
+      </p:sp>
+      <p:sp>
+        <p:nvSpPr>
+          <p:cNvPr id="6" name="Rounded Rectangle 5">
+            <a:extLst>
+              <a:ext uri="{FF2B5EF4-FFF2-40B4-BE49-F238E27FC236}">
+                <a16:creationId xmlns:a16="http://schemas.microsoft.com/office/drawing/2014/main" id="{85AC6BB3-59BB-6233-5F4D-9D653E286C40}"/>
+              </a:ext>
+            </a:extLst>
+          </p:cNvPr>
+          <p:cNvSpPr/>
+          <p:nvPr/>
+        </p:nvSpPr>
+        <p:spPr>
+          <a:xfrm>
+            <a:off x="6917760" y="1579898"/>
+            <a:ext cx="1772478" cy="919368"/>
+          </a:xfrm>
+          <a:prstGeom prst="roundRect">
+            <a:avLst/>
+          </a:prstGeom>
+          <a:ln w="38100">
+            <a:solidFill>
+              <a:schemeClr val="tx1"/>
+            </a:solidFill>
+          </a:ln>
+        </p:spPr>
+        <p:style>
+          <a:lnRef idx="2">
+            <a:schemeClr val="accent1"/>
+          </a:lnRef>
+          <a:fillRef idx="1">
+            <a:schemeClr val="lt1"/>
+          </a:fillRef>
+          <a:effectRef idx="0">
+            <a:schemeClr val="accent1"/>
+          </a:effectRef>
+          <a:fontRef idx="minor">
+            <a:schemeClr val="dk1"/>
+          </a:fontRef>
+        </p:style>
+        <p:txBody>
+          <a:bodyPr rtlCol="0" anchor="ctr"/>
+          <a:lstStyle/>
+          <a:p>
+            <a:pPr algn="ctr"/>
+            <a:r>
+              <a:rPr lang="en-US" dirty="0"/>
+              <a:t>Transforms</a:t>
+            </a:r>
+          </a:p>
+          <a:p>
+            <a:pPr algn="ctr"/>
+            <a:r>
+              <a:rPr lang="en-US" dirty="0">
+                <a:solidFill>
+                  <a:schemeClr val="tx2"/>
+                </a:solidFill>
+              </a:rPr>
+              <a:t>Code &amp; Test Contracts</a:t>
+            </a:r>
+          </a:p>
+        </p:txBody>
+      </p:sp>
+      <p:sp>
+        <p:nvSpPr>
+          <p:cNvPr id="7" name="Rounded Rectangle 6">
+            <a:extLst>
+              <a:ext uri="{FF2B5EF4-FFF2-40B4-BE49-F238E27FC236}">
+                <a16:creationId xmlns:a16="http://schemas.microsoft.com/office/drawing/2014/main" id="{2C8F0805-48BE-30FB-808E-AA72FFD41C08}"/>
+              </a:ext>
+            </a:extLst>
+          </p:cNvPr>
+          <p:cNvSpPr/>
+          <p:nvPr/>
+        </p:nvSpPr>
+        <p:spPr>
+          <a:xfrm>
+            <a:off x="10290464" y="1574015"/>
+            <a:ext cx="1772478" cy="919368"/>
+          </a:xfrm>
+          <a:prstGeom prst="roundRect">
+            <a:avLst/>
+          </a:prstGeom>
+          <a:ln w="38100">
+            <a:solidFill>
+              <a:schemeClr val="tx1"/>
+            </a:solidFill>
+          </a:ln>
+        </p:spPr>
+        <p:style>
+          <a:lnRef idx="2">
+            <a:schemeClr val="accent1"/>
+          </a:lnRef>
+          <a:fillRef idx="1">
+            <a:schemeClr val="lt1"/>
+          </a:fillRef>
+          <a:effectRef idx="0">
+            <a:schemeClr val="accent1"/>
+          </a:effectRef>
+          <a:fontRef idx="minor">
+            <a:schemeClr val="dk1"/>
+          </a:fontRef>
+        </p:style>
+        <p:txBody>
+          <a:bodyPr rtlCol="0" anchor="ctr"/>
+          <a:lstStyle/>
+          <a:p>
+            <a:pPr algn="ctr"/>
+            <a:r>
+              <a:rPr lang="en-US" dirty="0"/>
+              <a:t>Code Generation</a:t>
+            </a:r>
+          </a:p>
+          <a:p>
+            <a:pPr algn="ctr"/>
+            <a:r>
+              <a:rPr lang="en-US" dirty="0">
+                <a:solidFill>
+                  <a:schemeClr val="tx2"/>
+                </a:solidFill>
+              </a:rPr>
+              <a:t>HAMR &amp; SPLAT</a:t>
+            </a:r>
+            <a:endParaRPr lang="en-US" dirty="0"/>
+          </a:p>
+        </p:txBody>
+      </p:sp>
+      <p:sp>
+        <p:nvSpPr>
+          <p:cNvPr id="3" name="Diamond 2">
+            <a:extLst>
+              <a:ext uri="{FF2B5EF4-FFF2-40B4-BE49-F238E27FC236}">
+                <a16:creationId xmlns:a16="http://schemas.microsoft.com/office/drawing/2014/main" id="{2F76B349-683F-1636-375C-F9227A4B4580}"/>
+              </a:ext>
+            </a:extLst>
+          </p:cNvPr>
+          <p:cNvSpPr/>
+          <p:nvPr/>
+        </p:nvSpPr>
+        <p:spPr>
+          <a:xfrm>
+            <a:off x="2114419" y="1655815"/>
+            <a:ext cx="763837" cy="767534"/>
+          </a:xfrm>
+          <a:prstGeom prst="diamond">
+            <a:avLst/>
+          </a:prstGeom>
+          <a:ln w="38100"/>
+        </p:spPr>
+        <p:style>
+          <a:lnRef idx="2">
+            <a:schemeClr val="dk1"/>
+          </a:lnRef>
+          <a:fillRef idx="1">
+            <a:schemeClr val="lt1"/>
+          </a:fillRef>
+          <a:effectRef idx="0">
+            <a:schemeClr val="dk1"/>
+          </a:effectRef>
+          <a:fontRef idx="minor">
+            <a:schemeClr val="dk1"/>
+          </a:fontRef>
+        </p:style>
+        <p:txBody>
+          <a:bodyPr rtlCol="0" anchor="ctr"/>
+          <a:lstStyle/>
+          <a:p>
+            <a:pPr algn="ctr"/>
+            <a:r>
+              <a:rPr lang="en-US" sz="2000" b="1" dirty="0"/>
+              <a:t>?</a:t>
+            </a:r>
+          </a:p>
+        </p:txBody>
+      </p:sp>
+      <p:cxnSp>
+        <p:nvCxnSpPr>
+          <p:cNvPr id="24" name="Straight Arrow Connector 23">
+            <a:extLst>
+              <a:ext uri="{FF2B5EF4-FFF2-40B4-BE49-F238E27FC236}">
+                <a16:creationId xmlns:a16="http://schemas.microsoft.com/office/drawing/2014/main" id="{3E973642-F672-DC0E-08DF-1CC3CEA71724}"/>
+              </a:ext>
+            </a:extLst>
+          </p:cNvPr>
+          <p:cNvCxnSpPr>
+            <a:cxnSpLocks/>
+            <a:stCxn id="3" idx="3"/>
+          </p:cNvCxnSpPr>
+          <p:nvPr/>
+        </p:nvCxnSpPr>
+        <p:spPr>
+          <a:xfrm>
+            <a:off x="2878256" y="2039582"/>
+            <a:ext cx="635429" cy="0"/>
+          </a:xfrm>
+          <a:prstGeom prst="straightConnector1">
+            <a:avLst/>
+          </a:prstGeom>
+          <a:ln w="38100">
+            <a:tailEnd type="triangle"/>
+          </a:ln>
+        </p:spPr>
+        <p:style>
+          <a:lnRef idx="1">
+            <a:schemeClr val="dk1"/>
+          </a:lnRef>
+          <a:fillRef idx="0">
+            <a:schemeClr val="dk1"/>
+          </a:fillRef>
+          <a:effectRef idx="0">
+            <a:schemeClr val="dk1"/>
+          </a:effectRef>
+          <a:fontRef idx="minor">
+            <a:schemeClr val="tx1"/>
+          </a:fontRef>
+        </p:style>
+      </p:cxnSp>
+      <p:cxnSp>
+        <p:nvCxnSpPr>
+          <p:cNvPr id="26" name="Straight Arrow Connector 25">
+            <a:extLst>
+              <a:ext uri="{FF2B5EF4-FFF2-40B4-BE49-F238E27FC236}">
+                <a16:creationId xmlns:a16="http://schemas.microsoft.com/office/drawing/2014/main" id="{8CC53407-F071-3616-8121-C4E365B49368}"/>
+              </a:ext>
+            </a:extLst>
+          </p:cNvPr>
+          <p:cNvCxnSpPr>
+            <a:cxnSpLocks/>
+            <a:stCxn id="2" idx="2"/>
+          </p:cNvCxnSpPr>
+          <p:nvPr/>
+        </p:nvCxnSpPr>
+        <p:spPr>
+          <a:xfrm>
+            <a:off x="1052513" y="2489747"/>
+            <a:ext cx="0" cy="463518"/>
+          </a:xfrm>
+          <a:prstGeom prst="straightConnector1">
+            <a:avLst/>
+          </a:prstGeom>
+          <a:ln w="38100">
+            <a:tailEnd type="triangle"/>
+          </a:ln>
+        </p:spPr>
+        <p:style>
+          <a:lnRef idx="1">
+            <a:schemeClr val="dk1"/>
+          </a:lnRef>
+          <a:fillRef idx="0">
+            <a:schemeClr val="dk1"/>
+          </a:fillRef>
+          <a:effectRef idx="0">
+            <a:schemeClr val="dk1"/>
+          </a:effectRef>
+          <a:fontRef idx="minor">
+            <a:schemeClr val="tx1"/>
+          </a:fontRef>
+        </p:style>
+      </p:cxnSp>
+      <p:cxnSp>
+        <p:nvCxnSpPr>
+          <p:cNvPr id="36" name="Elbow Connector 35">
+            <a:extLst>
+              <a:ext uri="{FF2B5EF4-FFF2-40B4-BE49-F238E27FC236}">
+                <a16:creationId xmlns:a16="http://schemas.microsoft.com/office/drawing/2014/main" id="{EA41A39D-B932-5DFC-A07D-632C673A2BFB}"/>
+              </a:ext>
+            </a:extLst>
+          </p:cNvPr>
+          <p:cNvCxnSpPr>
+            <a:cxnSpLocks/>
+          </p:cNvCxnSpPr>
+          <p:nvPr/>
+        </p:nvCxnSpPr>
+        <p:spPr>
+          <a:xfrm rot="16200000" flipV="1">
+            <a:off x="1731708" y="878827"/>
+            <a:ext cx="85436" cy="1443825"/>
+          </a:xfrm>
+          <a:prstGeom prst="bentConnector3">
+            <a:avLst>
+              <a:gd name="adj1" fmla="val 584516"/>
+            </a:avLst>
+          </a:prstGeom>
+          <a:ln w="38100">
+            <a:solidFill>
+              <a:schemeClr val="tx1"/>
+            </a:solidFill>
+            <a:tailEnd type="triangle"/>
+          </a:ln>
+        </p:spPr>
+        <p:style>
+          <a:lnRef idx="1">
+            <a:schemeClr val="accent1"/>
+          </a:lnRef>
+          <a:fillRef idx="0">
+            <a:schemeClr val="accent1"/>
+          </a:fillRef>
+          <a:effectRef idx="0">
+            <a:schemeClr val="accent1"/>
+          </a:effectRef>
+          <a:fontRef idx="minor">
+            <a:schemeClr val="tx1"/>
+          </a:fontRef>
+        </p:style>
+      </p:cxnSp>
+      <p:sp>
+        <p:nvSpPr>
+          <p:cNvPr id="39" name="TextBox 38">
+            <a:extLst>
+              <a:ext uri="{FF2B5EF4-FFF2-40B4-BE49-F238E27FC236}">
+                <a16:creationId xmlns:a16="http://schemas.microsoft.com/office/drawing/2014/main" id="{2BEAF76B-4954-BA73-1761-BE9849CD3A76}"/>
+              </a:ext>
+            </a:extLst>
+          </p:cNvPr>
+          <p:cNvSpPr txBox="1"/>
+          <p:nvPr/>
+        </p:nvSpPr>
+        <p:spPr>
+          <a:xfrm>
+            <a:off x="2749848" y="1726643"/>
+            <a:ext cx="763837" cy="369332"/>
+          </a:xfrm>
+          <a:prstGeom prst="rect">
+            <a:avLst/>
+          </a:prstGeom>
+          <a:noFill/>
+        </p:spPr>
+        <p:txBody>
+          <a:bodyPr wrap="square" rtlCol="0">
+            <a:spAutoFit/>
+          </a:bodyPr>
+          <a:lstStyle/>
+          <a:p>
+            <a:pPr algn="ctr"/>
+            <a:r>
+              <a:rPr lang="en-US" b="1" dirty="0">
+                <a:solidFill>
+                  <a:schemeClr val="accent6"/>
+                </a:solidFill>
+              </a:rPr>
+              <a:t>Pass</a:t>
+            </a:r>
+          </a:p>
+        </p:txBody>
+      </p:sp>
+      <p:cxnSp>
+        <p:nvCxnSpPr>
+          <p:cNvPr id="40" name="Straight Arrow Connector 39">
+            <a:extLst>
+              <a:ext uri="{FF2B5EF4-FFF2-40B4-BE49-F238E27FC236}">
+                <a16:creationId xmlns:a16="http://schemas.microsoft.com/office/drawing/2014/main" id="{151F8461-A342-3C64-6EEA-F252883FCC05}"/>
+              </a:ext>
+            </a:extLst>
+          </p:cNvPr>
+          <p:cNvCxnSpPr>
+            <a:cxnSpLocks/>
+            <a:endCxn id="3" idx="2"/>
+          </p:cNvCxnSpPr>
+          <p:nvPr/>
+        </p:nvCxnSpPr>
+        <p:spPr>
+          <a:xfrm flipV="1">
+            <a:off x="2496338" y="2423349"/>
+            <a:ext cx="0" cy="529916"/>
+          </a:xfrm>
+          <a:prstGeom prst="straightConnector1">
+            <a:avLst/>
+          </a:prstGeom>
+          <a:ln w="38100">
+            <a:tailEnd type="triangle"/>
+          </a:ln>
+        </p:spPr>
+        <p:style>
+          <a:lnRef idx="1">
+            <a:schemeClr val="dk1"/>
+          </a:lnRef>
+          <a:fillRef idx="0">
+            <a:schemeClr val="dk1"/>
+          </a:fillRef>
+          <a:effectRef idx="0">
+            <a:schemeClr val="dk1"/>
+          </a:effectRef>
+          <a:fontRef idx="minor">
+            <a:schemeClr val="tx1"/>
+          </a:fontRef>
+        </p:style>
+      </p:cxnSp>
+      <p:sp>
+        <p:nvSpPr>
+          <p:cNvPr id="45" name="TextBox 44">
+            <a:extLst>
+              <a:ext uri="{FF2B5EF4-FFF2-40B4-BE49-F238E27FC236}">
+                <a16:creationId xmlns:a16="http://schemas.microsoft.com/office/drawing/2014/main" id="{91817205-3BD5-BD4C-3DA4-044DCB43C370}"/>
+              </a:ext>
+            </a:extLst>
+          </p:cNvPr>
+          <p:cNvSpPr txBox="1"/>
+          <p:nvPr/>
+        </p:nvSpPr>
+        <p:spPr>
+          <a:xfrm>
+            <a:off x="1071938" y="829535"/>
+            <a:ext cx="1458097" cy="369332"/>
+          </a:xfrm>
+          <a:prstGeom prst="rect">
+            <a:avLst/>
+          </a:prstGeom>
+          <a:noFill/>
+        </p:spPr>
+        <p:txBody>
+          <a:bodyPr wrap="square" rtlCol="0">
+            <a:spAutoFit/>
+          </a:bodyPr>
+          <a:lstStyle/>
+          <a:p>
+            <a:pPr algn="ctr"/>
+            <a:r>
+              <a:rPr lang="en-US" b="1" dirty="0">
+                <a:solidFill>
+                  <a:srgbClr val="FF0000"/>
+                </a:solidFill>
+              </a:rPr>
+              <a:t>Fail</a:t>
+            </a:r>
+          </a:p>
+        </p:txBody>
+      </p:sp>
+      <p:sp>
+        <p:nvSpPr>
+          <p:cNvPr id="68" name="TextBox 67">
+            <a:extLst>
+              <a:ext uri="{FF2B5EF4-FFF2-40B4-BE49-F238E27FC236}">
+                <a16:creationId xmlns:a16="http://schemas.microsoft.com/office/drawing/2014/main" id="{9B67A233-BB17-E3C4-8823-A75B4D200082}"/>
+              </a:ext>
+            </a:extLst>
+          </p:cNvPr>
+          <p:cNvSpPr txBox="1"/>
+          <p:nvPr/>
+        </p:nvSpPr>
+        <p:spPr>
+          <a:xfrm>
+            <a:off x="6241055" y="1726643"/>
+            <a:ext cx="532361" cy="369332"/>
+          </a:xfrm>
+          <a:prstGeom prst="rect">
+            <a:avLst/>
+          </a:prstGeom>
+          <a:noFill/>
+        </p:spPr>
+        <p:txBody>
+          <a:bodyPr wrap="square" rtlCol="0">
+            <a:spAutoFit/>
+          </a:bodyPr>
+          <a:lstStyle/>
+          <a:p>
+            <a:pPr algn="ctr"/>
+            <a:r>
+              <a:rPr lang="en-US" b="1" dirty="0">
+                <a:solidFill>
+                  <a:srgbClr val="FF0000"/>
+                </a:solidFill>
+              </a:rPr>
+              <a:t>Fail</a:t>
+            </a:r>
+          </a:p>
+        </p:txBody>
+      </p:sp>
+      <p:sp>
+        <p:nvSpPr>
+          <p:cNvPr id="76" name="Rectangle 75">
+            <a:extLst>
+              <a:ext uri="{FF2B5EF4-FFF2-40B4-BE49-F238E27FC236}">
+                <a16:creationId xmlns:a16="http://schemas.microsoft.com/office/drawing/2014/main" id="{9BD9E2BD-2474-8023-1DB2-E29EC9591203}"/>
+              </a:ext>
+            </a:extLst>
+          </p:cNvPr>
+          <p:cNvSpPr/>
+          <p:nvPr/>
+        </p:nvSpPr>
+        <p:spPr>
+          <a:xfrm>
+            <a:off x="4249292" y="2953265"/>
+            <a:ext cx="1759852" cy="993913"/>
+          </a:xfrm>
+          <a:prstGeom prst="rect">
+            <a:avLst/>
+          </a:prstGeom>
+          <a:ln w="38100"/>
+        </p:spPr>
+        <p:style>
+          <a:lnRef idx="2">
+            <a:schemeClr val="dk1"/>
+          </a:lnRef>
+          <a:fillRef idx="1">
+            <a:schemeClr val="lt1"/>
+          </a:fillRef>
+          <a:effectRef idx="0">
+            <a:schemeClr val="dk1"/>
+          </a:effectRef>
+          <a:fontRef idx="minor">
+            <a:schemeClr val="dk1"/>
+          </a:fontRef>
+        </p:style>
+        <p:txBody>
+          <a:bodyPr rtlCol="0" anchor="ctr"/>
+          <a:lstStyle/>
+          <a:p>
+            <a:pPr algn="ctr"/>
+            <a:r>
+              <a:rPr lang="en-US" dirty="0"/>
+              <a:t>AGREE Verification Engine</a:t>
+            </a:r>
+          </a:p>
+        </p:txBody>
+      </p:sp>
+      <p:cxnSp>
+        <p:nvCxnSpPr>
+          <p:cNvPr id="77" name="Straight Arrow Connector 76">
+            <a:extLst>
+              <a:ext uri="{FF2B5EF4-FFF2-40B4-BE49-F238E27FC236}">
+                <a16:creationId xmlns:a16="http://schemas.microsoft.com/office/drawing/2014/main" id="{817F64D3-371E-EB1F-3AAA-A7BE2ECC65EF}"/>
+              </a:ext>
+            </a:extLst>
+          </p:cNvPr>
+          <p:cNvCxnSpPr>
+            <a:cxnSpLocks/>
+            <a:stCxn id="4" idx="2"/>
+          </p:cNvCxnSpPr>
+          <p:nvPr/>
+        </p:nvCxnSpPr>
+        <p:spPr>
+          <a:xfrm>
+            <a:off x="4424361" y="2487303"/>
+            <a:ext cx="14767" cy="465962"/>
+          </a:xfrm>
+          <a:prstGeom prst="straightConnector1">
+            <a:avLst/>
+          </a:prstGeom>
+          <a:ln w="38100">
+            <a:tailEnd type="triangle"/>
+          </a:ln>
+        </p:spPr>
+        <p:style>
+          <a:lnRef idx="1">
+            <a:schemeClr val="dk1"/>
+          </a:lnRef>
+          <a:fillRef idx="0">
+            <a:schemeClr val="dk1"/>
+          </a:fillRef>
+          <a:effectRef idx="0">
+            <a:schemeClr val="dk1"/>
+          </a:effectRef>
+          <a:fontRef idx="minor">
+            <a:schemeClr val="tx1"/>
+          </a:fontRef>
+        </p:style>
+      </p:cxnSp>
+      <p:cxnSp>
+        <p:nvCxnSpPr>
+          <p:cNvPr id="78" name="Straight Arrow Connector 77">
+            <a:extLst>
+              <a:ext uri="{FF2B5EF4-FFF2-40B4-BE49-F238E27FC236}">
+                <a16:creationId xmlns:a16="http://schemas.microsoft.com/office/drawing/2014/main" id="{63D787C9-0771-4CA0-B4FB-DB33977F312D}"/>
+              </a:ext>
+            </a:extLst>
+          </p:cNvPr>
+          <p:cNvCxnSpPr>
+            <a:cxnSpLocks/>
+          </p:cNvCxnSpPr>
+          <p:nvPr/>
+        </p:nvCxnSpPr>
+        <p:spPr>
+          <a:xfrm flipV="1">
+            <a:off x="5882953" y="2423349"/>
+            <a:ext cx="0" cy="529916"/>
+          </a:xfrm>
+          <a:prstGeom prst="straightConnector1">
+            <a:avLst/>
+          </a:prstGeom>
+          <a:ln w="38100">
+            <a:tailEnd type="triangle"/>
+          </a:ln>
+        </p:spPr>
+        <p:style>
+          <a:lnRef idx="1">
+            <a:schemeClr val="dk1"/>
+          </a:lnRef>
+          <a:fillRef idx="0">
+            <a:schemeClr val="dk1"/>
+          </a:fillRef>
+          <a:effectRef idx="0">
+            <a:schemeClr val="dk1"/>
+          </a:effectRef>
+          <a:fontRef idx="minor">
+            <a:schemeClr val="tx1"/>
+          </a:fontRef>
+        </p:style>
+      </p:cxnSp>
+      <p:sp>
+        <p:nvSpPr>
+          <p:cNvPr id="79" name="Diamond 78">
+            <a:extLst>
+              <a:ext uri="{FF2B5EF4-FFF2-40B4-BE49-F238E27FC236}">
+                <a16:creationId xmlns:a16="http://schemas.microsoft.com/office/drawing/2014/main" id="{9FD36FCB-4A45-9A9F-CDDC-9ACF334D6481}"/>
+              </a:ext>
+            </a:extLst>
+          </p:cNvPr>
+          <p:cNvSpPr/>
+          <p:nvPr/>
+        </p:nvSpPr>
+        <p:spPr>
+          <a:xfrm>
+            <a:off x="5500192" y="1645187"/>
+            <a:ext cx="763837" cy="767534"/>
+          </a:xfrm>
+          <a:prstGeom prst="diamond">
+            <a:avLst/>
+          </a:prstGeom>
+          <a:ln w="38100"/>
+        </p:spPr>
+        <p:style>
+          <a:lnRef idx="2">
+            <a:schemeClr val="dk1"/>
+          </a:lnRef>
+          <a:fillRef idx="1">
+            <a:schemeClr val="lt1"/>
+          </a:fillRef>
+          <a:effectRef idx="0">
+            <a:schemeClr val="dk1"/>
+          </a:effectRef>
+          <a:fontRef idx="minor">
+            <a:schemeClr val="dk1"/>
+          </a:fontRef>
+        </p:style>
+        <p:txBody>
+          <a:bodyPr rtlCol="0" anchor="ctr"/>
+          <a:lstStyle/>
+          <a:p>
+            <a:pPr algn="ctr"/>
+            <a:r>
+              <a:rPr lang="en-US" sz="2000" b="1" dirty="0"/>
+              <a:t>?</a:t>
+            </a:r>
+          </a:p>
+        </p:txBody>
+      </p:sp>
+      <p:cxnSp>
+        <p:nvCxnSpPr>
+          <p:cNvPr id="80" name="Straight Arrow Connector 79">
+            <a:extLst>
+              <a:ext uri="{FF2B5EF4-FFF2-40B4-BE49-F238E27FC236}">
+                <a16:creationId xmlns:a16="http://schemas.microsoft.com/office/drawing/2014/main" id="{C3D5B361-B9A1-8BBD-DAA9-6639EEE26930}"/>
+              </a:ext>
+            </a:extLst>
+          </p:cNvPr>
+          <p:cNvCxnSpPr>
+            <a:cxnSpLocks/>
+            <a:stCxn id="79" idx="3"/>
+          </p:cNvCxnSpPr>
+          <p:nvPr/>
+        </p:nvCxnSpPr>
+        <p:spPr>
+          <a:xfrm>
+            <a:off x="6264029" y="2028954"/>
+            <a:ext cx="635429" cy="0"/>
+          </a:xfrm>
+          <a:prstGeom prst="straightConnector1">
+            <a:avLst/>
+          </a:prstGeom>
+          <a:ln w="38100">
+            <a:tailEnd type="triangle"/>
+          </a:ln>
+        </p:spPr>
+        <p:style>
+          <a:lnRef idx="1">
+            <a:schemeClr val="dk1"/>
+          </a:lnRef>
+          <a:fillRef idx="0">
+            <a:schemeClr val="dk1"/>
+          </a:fillRef>
+          <a:effectRef idx="0">
+            <a:schemeClr val="dk1"/>
+          </a:effectRef>
+          <a:fontRef idx="minor">
+            <a:schemeClr val="tx1"/>
+          </a:fontRef>
+        </p:style>
+      </p:cxnSp>
+      <p:sp>
+        <p:nvSpPr>
+          <p:cNvPr id="81" name="TextBox 80">
+            <a:extLst>
+              <a:ext uri="{FF2B5EF4-FFF2-40B4-BE49-F238E27FC236}">
+                <a16:creationId xmlns:a16="http://schemas.microsoft.com/office/drawing/2014/main" id="{57266840-17C4-D4E1-59E0-BD776E99249B}"/>
+              </a:ext>
+            </a:extLst>
+          </p:cNvPr>
+          <p:cNvSpPr txBox="1"/>
+          <p:nvPr/>
+        </p:nvSpPr>
+        <p:spPr>
+          <a:xfrm>
+            <a:off x="9513144" y="1726643"/>
+            <a:ext cx="763837" cy="369332"/>
+          </a:xfrm>
+          <a:prstGeom prst="rect">
+            <a:avLst/>
+          </a:prstGeom>
+          <a:noFill/>
+        </p:spPr>
+        <p:txBody>
+          <a:bodyPr wrap="square" rtlCol="0">
+            <a:spAutoFit/>
+          </a:bodyPr>
+          <a:lstStyle/>
+          <a:p>
+            <a:pPr algn="ctr"/>
+            <a:r>
+              <a:rPr lang="en-US" b="1" dirty="0">
+                <a:solidFill>
+                  <a:schemeClr val="accent6"/>
+                </a:solidFill>
+              </a:rPr>
+              <a:t>Pass</a:t>
+            </a:r>
+          </a:p>
+        </p:txBody>
+      </p:sp>
+      <p:sp>
+        <p:nvSpPr>
+          <p:cNvPr id="84" name="Rectangle 83">
+            <a:extLst>
+              <a:ext uri="{FF2B5EF4-FFF2-40B4-BE49-F238E27FC236}">
+                <a16:creationId xmlns:a16="http://schemas.microsoft.com/office/drawing/2014/main" id="{95776BCA-E790-8F73-E673-FF05F6C9698C}"/>
+              </a:ext>
+            </a:extLst>
+          </p:cNvPr>
+          <p:cNvSpPr/>
+          <p:nvPr/>
+        </p:nvSpPr>
+        <p:spPr>
+          <a:xfrm>
+            <a:off x="7626815" y="2957382"/>
+            <a:ext cx="1759852" cy="993913"/>
+          </a:xfrm>
+          <a:prstGeom prst="rect">
+            <a:avLst/>
+          </a:prstGeom>
+          <a:ln w="38100"/>
+        </p:spPr>
+        <p:style>
+          <a:lnRef idx="2">
+            <a:schemeClr val="dk1"/>
+          </a:lnRef>
+          <a:fillRef idx="1">
+            <a:schemeClr val="lt1"/>
+          </a:fillRef>
+          <a:effectRef idx="0">
+            <a:schemeClr val="dk1"/>
+          </a:effectRef>
+          <a:fontRef idx="minor">
+            <a:schemeClr val="dk1"/>
+          </a:fontRef>
+        </p:style>
+        <p:txBody>
+          <a:bodyPr rtlCol="0" anchor="ctr"/>
+          <a:lstStyle/>
+          <a:p>
+            <a:pPr algn="ctr"/>
+            <a:r>
+              <a:rPr lang="en-US" dirty="0"/>
+              <a:t>AGREE Verification Engine</a:t>
+            </a:r>
+          </a:p>
+        </p:txBody>
+      </p:sp>
+      <p:cxnSp>
+        <p:nvCxnSpPr>
+          <p:cNvPr id="85" name="Straight Arrow Connector 84">
+            <a:extLst>
+              <a:ext uri="{FF2B5EF4-FFF2-40B4-BE49-F238E27FC236}">
+                <a16:creationId xmlns:a16="http://schemas.microsoft.com/office/drawing/2014/main" id="{20393BDF-4985-CB6D-4188-77EB27B0BB70}"/>
+              </a:ext>
+            </a:extLst>
+          </p:cNvPr>
+          <p:cNvCxnSpPr>
+            <a:cxnSpLocks/>
+          </p:cNvCxnSpPr>
+          <p:nvPr/>
+        </p:nvCxnSpPr>
+        <p:spPr>
+          <a:xfrm>
+            <a:off x="7801884" y="2491420"/>
+            <a:ext cx="14767" cy="465962"/>
+          </a:xfrm>
+          <a:prstGeom prst="straightConnector1">
+            <a:avLst/>
+          </a:prstGeom>
+          <a:ln w="38100">
+            <a:tailEnd type="triangle"/>
+          </a:ln>
+        </p:spPr>
+        <p:style>
+          <a:lnRef idx="1">
+            <a:schemeClr val="dk1"/>
+          </a:lnRef>
+          <a:fillRef idx="0">
+            <a:schemeClr val="dk1"/>
+          </a:fillRef>
+          <a:effectRef idx="0">
+            <a:schemeClr val="dk1"/>
+          </a:effectRef>
+          <a:fontRef idx="minor">
+            <a:schemeClr val="tx1"/>
+          </a:fontRef>
+        </p:style>
+      </p:cxnSp>
+      <p:cxnSp>
+        <p:nvCxnSpPr>
+          <p:cNvPr id="86" name="Straight Arrow Connector 85">
+            <a:extLst>
+              <a:ext uri="{FF2B5EF4-FFF2-40B4-BE49-F238E27FC236}">
+                <a16:creationId xmlns:a16="http://schemas.microsoft.com/office/drawing/2014/main" id="{E64B683D-6D0F-F01E-6703-DE809BB5F3DE}"/>
+              </a:ext>
+            </a:extLst>
+          </p:cNvPr>
+          <p:cNvCxnSpPr>
+            <a:cxnSpLocks/>
+          </p:cNvCxnSpPr>
+          <p:nvPr/>
+        </p:nvCxnSpPr>
+        <p:spPr>
+          <a:xfrm flipV="1">
+            <a:off x="9260476" y="2427466"/>
+            <a:ext cx="0" cy="529916"/>
+          </a:xfrm>
+          <a:prstGeom prst="straightConnector1">
+            <a:avLst/>
+          </a:prstGeom>
+          <a:ln w="38100">
+            <a:tailEnd type="triangle"/>
+          </a:ln>
+        </p:spPr>
+        <p:style>
+          <a:lnRef idx="1">
+            <a:schemeClr val="dk1"/>
+          </a:lnRef>
+          <a:fillRef idx="0">
+            <a:schemeClr val="dk1"/>
+          </a:fillRef>
+          <a:effectRef idx="0">
+            <a:schemeClr val="dk1"/>
+          </a:effectRef>
+          <a:fontRef idx="minor">
+            <a:schemeClr val="tx1"/>
+          </a:fontRef>
+        </p:style>
+      </p:cxnSp>
+      <p:sp>
+        <p:nvSpPr>
+          <p:cNvPr id="87" name="Diamond 86">
+            <a:extLst>
+              <a:ext uri="{FF2B5EF4-FFF2-40B4-BE49-F238E27FC236}">
+                <a16:creationId xmlns:a16="http://schemas.microsoft.com/office/drawing/2014/main" id="{0ECB561C-FA1E-6BFF-BD6A-8ED898E93E13}"/>
+              </a:ext>
+            </a:extLst>
+          </p:cNvPr>
+          <p:cNvSpPr/>
+          <p:nvPr/>
+        </p:nvSpPr>
+        <p:spPr>
+          <a:xfrm>
+            <a:off x="8877715" y="1649304"/>
+            <a:ext cx="763837" cy="767534"/>
+          </a:xfrm>
+          <a:prstGeom prst="diamond">
+            <a:avLst/>
+          </a:prstGeom>
+          <a:ln w="38100"/>
+        </p:spPr>
+        <p:style>
+          <a:lnRef idx="2">
+            <a:schemeClr val="dk1"/>
+          </a:lnRef>
+          <a:fillRef idx="1">
+            <a:schemeClr val="lt1"/>
+          </a:fillRef>
+          <a:effectRef idx="0">
+            <a:schemeClr val="dk1"/>
+          </a:effectRef>
+          <a:fontRef idx="minor">
+            <a:schemeClr val="dk1"/>
+          </a:fontRef>
+        </p:style>
+        <p:txBody>
+          <a:bodyPr rtlCol="0" anchor="ctr"/>
+          <a:lstStyle/>
+          <a:p>
+            <a:pPr algn="ctr"/>
+            <a:r>
+              <a:rPr lang="en-US" sz="2000" b="1" dirty="0"/>
+              <a:t>?</a:t>
+            </a:r>
+          </a:p>
+        </p:txBody>
+      </p:sp>
+      <p:cxnSp>
+        <p:nvCxnSpPr>
+          <p:cNvPr id="88" name="Straight Arrow Connector 87">
+            <a:extLst>
+              <a:ext uri="{FF2B5EF4-FFF2-40B4-BE49-F238E27FC236}">
+                <a16:creationId xmlns:a16="http://schemas.microsoft.com/office/drawing/2014/main" id="{7BC1E385-D6D2-4C8D-049A-4F3776AD9FD1}"/>
+              </a:ext>
+            </a:extLst>
+          </p:cNvPr>
+          <p:cNvCxnSpPr>
+            <a:cxnSpLocks/>
+            <a:stCxn id="87" idx="3"/>
+          </p:cNvCxnSpPr>
+          <p:nvPr/>
+        </p:nvCxnSpPr>
+        <p:spPr>
+          <a:xfrm>
+            <a:off x="9641552" y="2033071"/>
+            <a:ext cx="635429" cy="0"/>
+          </a:xfrm>
+          <a:prstGeom prst="straightConnector1">
+            <a:avLst/>
+          </a:prstGeom>
+          <a:ln w="38100">
+            <a:tailEnd type="triangle"/>
+          </a:ln>
+        </p:spPr>
+        <p:style>
+          <a:lnRef idx="1">
+            <a:schemeClr val="dk1"/>
+          </a:lnRef>
+          <a:fillRef idx="0">
+            <a:schemeClr val="dk1"/>
+          </a:fillRef>
+          <a:effectRef idx="0">
+            <a:schemeClr val="dk1"/>
+          </a:effectRef>
+          <a:fontRef idx="minor">
+            <a:schemeClr val="tx1"/>
+          </a:fontRef>
+        </p:style>
+      </p:cxnSp>
+      <p:cxnSp>
+        <p:nvCxnSpPr>
+          <p:cNvPr id="89" name="Elbow Connector 88">
+            <a:extLst>
+              <a:ext uri="{FF2B5EF4-FFF2-40B4-BE49-F238E27FC236}">
+                <a16:creationId xmlns:a16="http://schemas.microsoft.com/office/drawing/2014/main" id="{0E15FEB5-6C10-3D16-06E3-D9B9D695CBD3}"/>
+              </a:ext>
+            </a:extLst>
+          </p:cNvPr>
+          <p:cNvCxnSpPr>
+            <a:cxnSpLocks/>
+          </p:cNvCxnSpPr>
+          <p:nvPr/>
+        </p:nvCxnSpPr>
+        <p:spPr>
+          <a:xfrm rot="16200000" flipV="1">
+            <a:off x="8477417" y="880557"/>
+            <a:ext cx="85436" cy="1443825"/>
+          </a:xfrm>
+          <a:prstGeom prst="bentConnector3">
+            <a:avLst>
+              <a:gd name="adj1" fmla="val 584516"/>
+            </a:avLst>
+          </a:prstGeom>
+          <a:ln w="38100">
+            <a:solidFill>
+              <a:schemeClr val="tx1"/>
+            </a:solidFill>
+            <a:tailEnd type="triangle"/>
+          </a:ln>
+        </p:spPr>
+        <p:style>
+          <a:lnRef idx="1">
+            <a:schemeClr val="accent1"/>
+          </a:lnRef>
+          <a:fillRef idx="0">
+            <a:schemeClr val="accent1"/>
+          </a:fillRef>
+          <a:effectRef idx="0">
+            <a:schemeClr val="accent1"/>
+          </a:effectRef>
+          <a:fontRef idx="minor">
+            <a:schemeClr val="tx1"/>
+          </a:fontRef>
+        </p:style>
+      </p:cxnSp>
+      <p:sp>
+        <p:nvSpPr>
+          <p:cNvPr id="90" name="TextBox 89">
+            <a:extLst>
+              <a:ext uri="{FF2B5EF4-FFF2-40B4-BE49-F238E27FC236}">
+                <a16:creationId xmlns:a16="http://schemas.microsoft.com/office/drawing/2014/main" id="{D40A47E9-7E22-0837-DC16-576027F7904A}"/>
+              </a:ext>
+            </a:extLst>
+          </p:cNvPr>
+          <p:cNvSpPr txBox="1"/>
+          <p:nvPr/>
+        </p:nvSpPr>
+        <p:spPr>
+          <a:xfrm>
+            <a:off x="7817647" y="831265"/>
+            <a:ext cx="1458097" cy="369332"/>
+          </a:xfrm>
+          <a:prstGeom prst="rect">
+            <a:avLst/>
+          </a:prstGeom>
+          <a:noFill/>
+        </p:spPr>
+        <p:txBody>
+          <a:bodyPr wrap="square" rtlCol="0">
+            <a:spAutoFit/>
+          </a:bodyPr>
+          <a:lstStyle/>
+          <a:p>
+            <a:pPr algn="ctr"/>
+            <a:r>
+              <a:rPr lang="en-US" b="1" dirty="0">
+                <a:solidFill>
+                  <a:srgbClr val="FF0000"/>
+                </a:solidFill>
+              </a:rPr>
+              <a:t>Fail</a:t>
+            </a:r>
+          </a:p>
+        </p:txBody>
+      </p:sp>
+      <p:cxnSp>
+        <p:nvCxnSpPr>
+          <p:cNvPr id="92" name="Elbow Connector 91">
+            <a:extLst>
+              <a:ext uri="{FF2B5EF4-FFF2-40B4-BE49-F238E27FC236}">
+                <a16:creationId xmlns:a16="http://schemas.microsoft.com/office/drawing/2014/main" id="{32DC0C43-F76A-F622-E5DE-C7F8C553DE0B}"/>
+              </a:ext>
+            </a:extLst>
+          </p:cNvPr>
+          <p:cNvCxnSpPr>
+            <a:cxnSpLocks/>
+            <a:stCxn id="79" idx="0"/>
+            <a:endCxn id="7" idx="0"/>
+          </p:cNvCxnSpPr>
+          <p:nvPr/>
+        </p:nvCxnSpPr>
+        <p:spPr>
+          <a:xfrm rot="5400000" flipH="1" flipV="1">
+            <a:off x="8493821" y="-1037695"/>
+            <a:ext cx="71172" cy="5294592"/>
+          </a:xfrm>
+          <a:prstGeom prst="bentConnector3">
+            <a:avLst>
+              <a:gd name="adj1" fmla="val 1306647"/>
+            </a:avLst>
+          </a:prstGeom>
+          <a:ln w="38100">
+            <a:solidFill>
+              <a:schemeClr val="tx1"/>
+            </a:solidFill>
+            <a:tailEnd type="triangle"/>
+          </a:ln>
+        </p:spPr>
+        <p:style>
+          <a:lnRef idx="1">
+            <a:schemeClr val="accent1"/>
+          </a:lnRef>
+          <a:fillRef idx="0">
+            <a:schemeClr val="accent1"/>
+          </a:fillRef>
+          <a:effectRef idx="0">
+            <a:schemeClr val="accent1"/>
+          </a:effectRef>
+          <a:fontRef idx="minor">
+            <a:schemeClr val="tx1"/>
+          </a:fontRef>
+        </p:style>
+      </p:cxnSp>
+      <p:sp>
+        <p:nvSpPr>
+          <p:cNvPr id="95" name="TextBox 94">
+            <a:extLst>
+              <a:ext uri="{FF2B5EF4-FFF2-40B4-BE49-F238E27FC236}">
+                <a16:creationId xmlns:a16="http://schemas.microsoft.com/office/drawing/2014/main" id="{C86DA44D-3AA1-BD10-AA73-2DD62FA0AE6D}"/>
+              </a:ext>
+            </a:extLst>
+          </p:cNvPr>
+          <p:cNvSpPr txBox="1"/>
+          <p:nvPr/>
+        </p:nvSpPr>
+        <p:spPr>
+          <a:xfrm>
+            <a:off x="8147488" y="381641"/>
+            <a:ext cx="763837" cy="369332"/>
+          </a:xfrm>
+          <a:prstGeom prst="rect">
+            <a:avLst/>
+          </a:prstGeom>
+          <a:noFill/>
+        </p:spPr>
+        <p:txBody>
+          <a:bodyPr wrap="square" rtlCol="0">
+            <a:spAutoFit/>
+          </a:bodyPr>
+          <a:lstStyle/>
+          <a:p>
+            <a:pPr algn="ctr"/>
+            <a:r>
+              <a:rPr lang="en-US" b="1" dirty="0">
+                <a:solidFill>
+                  <a:schemeClr val="accent6"/>
+                </a:solidFill>
+              </a:rPr>
+              <a:t>Pass</a:t>
+            </a:r>
+          </a:p>
+        </p:txBody>
+      </p:sp>
+    </p:spTree>
+    <p:extLst>
+      <p:ext uri="{BB962C8B-B14F-4D97-AF65-F5344CB8AC3E}">
+        <p14:creationId xmlns:p14="http://schemas.microsoft.com/office/powerpoint/2010/main" val="2574776119"/>
+      </p:ext>
+    </p:extLst>
+  </p:cSld>
+  <p:clrMapOvr>
+    <a:masterClrMapping/>
+  </p:clrMapOvr>
+</p:sld>
+</file>
+
+<file path=ppt/slides/slide2.xml><?xml version="1.0" encoding="utf-8"?>
+<p:sld xmlns:a="http://schemas.openxmlformats.org/drawingml/2006/main" xmlns:r="http://schemas.openxmlformats.org/officeDocument/2006/relationships" xmlns:p="http://schemas.openxmlformats.org/presentationml/2006/main">
+  <p:cSld>
+    <p:spTree>
+      <p:nvGrpSpPr>
+        <p:cNvPr id="1" name=""/>
+        <p:cNvGrpSpPr/>
+        <p:nvPr/>
+      </p:nvGrpSpPr>
+      <p:grpSpPr>
+        <a:xfrm>
+          <a:off x="0" y="0"/>
+          <a:ext cx="0" cy="0"/>
+          <a:chOff x="0" y="0"/>
+          <a:chExt cx="0" cy="0"/>
+        </a:xfrm>
+      </p:grpSpPr>
+      <p:sp>
+        <p:nvSpPr>
           <p:cNvPr id="18" name="Rectangle 17">
             <a:extLst>
               <a:ext uri="{FF2B5EF4-FFF2-40B4-BE49-F238E27FC236}">
@@ -4192,7 +5530,7 @@
     </p:spTree>
     <p:extLst>
       <p:ext uri="{BB962C8B-B14F-4D97-AF65-F5344CB8AC3E}">
-        <p14:creationId xmlns:p14="http://schemas.microsoft.com/office/powerpoint/2010/main" val="2574776119"/>
+        <p14:creationId xmlns:p14="http://schemas.microsoft.com/office/powerpoint/2010/main" val="3302828106"/>
       </p:ext>
     </p:extLst>
   </p:cSld>

</xml_diff>

<commit_message>
Add paragraph on the workflow
</commit_message>
<xml_diff>
--- a/paper/figs/workflow.pptx
+++ b/paper/figs/workflow.pptx
@@ -260,7 +260,7 @@
           <a:p>
             <a:fld id="{F11C6F8B-160A-4147-B7E2-F2783ACD33C4}" type="datetimeFigureOut">
               <a:rPr lang="en-US" smtClean="0"/>
-              <a:t>12/8/22</a:t>
+              <a:t>12/19/22</a:t>
             </a:fld>
             <a:endParaRPr lang="en-US"/>
           </a:p>
@@ -458,7 +458,7 @@
           <a:p>
             <a:fld id="{F11C6F8B-160A-4147-B7E2-F2783ACD33C4}" type="datetimeFigureOut">
               <a:rPr lang="en-US" smtClean="0"/>
-              <a:t>12/8/22</a:t>
+              <a:t>12/19/22</a:t>
             </a:fld>
             <a:endParaRPr lang="en-US"/>
           </a:p>
@@ -666,7 +666,7 @@
           <a:p>
             <a:fld id="{F11C6F8B-160A-4147-B7E2-F2783ACD33C4}" type="datetimeFigureOut">
               <a:rPr lang="en-US" smtClean="0"/>
-              <a:t>12/8/22</a:t>
+              <a:t>12/19/22</a:t>
             </a:fld>
             <a:endParaRPr lang="en-US"/>
           </a:p>
@@ -864,7 +864,7 @@
           <a:p>
             <a:fld id="{F11C6F8B-160A-4147-B7E2-F2783ACD33C4}" type="datetimeFigureOut">
               <a:rPr lang="en-US" smtClean="0"/>
-              <a:t>12/8/22</a:t>
+              <a:t>12/19/22</a:t>
             </a:fld>
             <a:endParaRPr lang="en-US"/>
           </a:p>
@@ -1139,7 +1139,7 @@
           <a:p>
             <a:fld id="{F11C6F8B-160A-4147-B7E2-F2783ACD33C4}" type="datetimeFigureOut">
               <a:rPr lang="en-US" smtClean="0"/>
-              <a:t>12/8/22</a:t>
+              <a:t>12/19/22</a:t>
             </a:fld>
             <a:endParaRPr lang="en-US"/>
           </a:p>
@@ -1404,7 +1404,7 @@
           <a:p>
             <a:fld id="{F11C6F8B-160A-4147-B7E2-F2783ACD33C4}" type="datetimeFigureOut">
               <a:rPr lang="en-US" smtClean="0"/>
-              <a:t>12/8/22</a:t>
+              <a:t>12/19/22</a:t>
             </a:fld>
             <a:endParaRPr lang="en-US"/>
           </a:p>
@@ -1816,7 +1816,7 @@
           <a:p>
             <a:fld id="{F11C6F8B-160A-4147-B7E2-F2783ACD33C4}" type="datetimeFigureOut">
               <a:rPr lang="en-US" smtClean="0"/>
-              <a:t>12/8/22</a:t>
+              <a:t>12/19/22</a:t>
             </a:fld>
             <a:endParaRPr lang="en-US"/>
           </a:p>
@@ -1957,7 +1957,7 @@
           <a:p>
             <a:fld id="{F11C6F8B-160A-4147-B7E2-F2783ACD33C4}" type="datetimeFigureOut">
               <a:rPr lang="en-US" smtClean="0"/>
-              <a:t>12/8/22</a:t>
+              <a:t>12/19/22</a:t>
             </a:fld>
             <a:endParaRPr lang="en-US"/>
           </a:p>
@@ -2070,7 +2070,7 @@
           <a:p>
             <a:fld id="{F11C6F8B-160A-4147-B7E2-F2783ACD33C4}" type="datetimeFigureOut">
               <a:rPr lang="en-US" smtClean="0"/>
-              <a:t>12/8/22</a:t>
+              <a:t>12/19/22</a:t>
             </a:fld>
             <a:endParaRPr lang="en-US"/>
           </a:p>
@@ -2381,7 +2381,7 @@
           <a:p>
             <a:fld id="{F11C6F8B-160A-4147-B7E2-F2783ACD33C4}" type="datetimeFigureOut">
               <a:rPr lang="en-US" smtClean="0"/>
-              <a:t>12/8/22</a:t>
+              <a:t>12/19/22</a:t>
             </a:fld>
             <a:endParaRPr lang="en-US"/>
           </a:p>
@@ -2669,7 +2669,7 @@
           <a:p>
             <a:fld id="{F11C6F8B-160A-4147-B7E2-F2783ACD33C4}" type="datetimeFigureOut">
               <a:rPr lang="en-US" smtClean="0"/>
-              <a:t>12/8/22</a:t>
+              <a:t>12/19/22</a:t>
             </a:fld>
             <a:endParaRPr lang="en-US"/>
           </a:p>
@@ -2910,7 +2910,7 @@
           <a:p>
             <a:fld id="{F11C6F8B-160A-4147-B7E2-F2783ACD33C4}" type="datetimeFigureOut">
               <a:rPr lang="en-US" smtClean="0"/>
-              <a:t>12/8/22</a:t>
+              <a:t>12/19/22</a:t>
             </a:fld>
             <a:endParaRPr lang="en-US"/>
           </a:p>
@@ -3628,12 +3628,12 @@
           <a:p>
             <a:pPr algn="ctr"/>
             <a:r>
-              <a:rPr lang="en-US" dirty="0">
+              <a:rPr lang="en-US">
                 <a:solidFill>
                   <a:schemeClr val="tx2"/>
                 </a:solidFill>
               </a:rPr>
-              <a:t>HAMR &amp; SPLAT</a:t>
+              <a:t>SPLAT</a:t>
             </a:r>
             <a:endParaRPr lang="en-US" dirty="0"/>
           </a:p>
@@ -4630,6 +4630,83 @@
                 </a:solidFill>
               </a:rPr>
               <a:t>Pass</a:t>
+            </a:r>
+          </a:p>
+        </p:txBody>
+      </p:sp>
+      <p:cxnSp>
+        <p:nvCxnSpPr>
+          <p:cNvPr id="8" name="Straight Arrow Connector 7">
+            <a:extLst>
+              <a:ext uri="{FF2B5EF4-FFF2-40B4-BE49-F238E27FC236}">
+                <a16:creationId xmlns:a16="http://schemas.microsoft.com/office/drawing/2014/main" id="{36715D37-9546-42C9-EC4C-C8D5C2AB98B8}"/>
+              </a:ext>
+            </a:extLst>
+          </p:cNvPr>
+          <p:cNvCxnSpPr>
+            <a:cxnSpLocks/>
+          </p:cNvCxnSpPr>
+          <p:nvPr/>
+        </p:nvCxnSpPr>
+        <p:spPr>
+          <a:xfrm>
+            <a:off x="553900" y="750973"/>
+            <a:ext cx="0" cy="828925"/>
+          </a:xfrm>
+          <a:prstGeom prst="straightConnector1">
+            <a:avLst/>
+          </a:prstGeom>
+          <a:ln w="38100">
+            <a:tailEnd type="triangle"/>
+          </a:ln>
+        </p:spPr>
+        <p:style>
+          <a:lnRef idx="1">
+            <a:schemeClr val="dk1"/>
+          </a:lnRef>
+          <a:fillRef idx="0">
+            <a:schemeClr val="dk1"/>
+          </a:fillRef>
+          <a:effectRef idx="0">
+            <a:schemeClr val="dk1"/>
+          </a:effectRef>
+          <a:fontRef idx="minor">
+            <a:schemeClr val="tx1"/>
+          </a:fontRef>
+        </p:style>
+      </p:cxnSp>
+      <p:sp>
+        <p:nvSpPr>
+          <p:cNvPr id="12" name="TextBox 11">
+            <a:extLst>
+              <a:ext uri="{FF2B5EF4-FFF2-40B4-BE49-F238E27FC236}">
+                <a16:creationId xmlns:a16="http://schemas.microsoft.com/office/drawing/2014/main" id="{59AB4CEF-B558-207C-636B-78C548A2474C}"/>
+              </a:ext>
+            </a:extLst>
+          </p:cNvPr>
+          <p:cNvSpPr txBox="1"/>
+          <p:nvPr/>
+        </p:nvSpPr>
+        <p:spPr>
+          <a:xfrm>
+            <a:off x="-175149" y="379442"/>
+            <a:ext cx="1458097" cy="369332"/>
+          </a:xfrm>
+          <a:prstGeom prst="rect">
+            <a:avLst/>
+          </a:prstGeom>
+          <a:noFill/>
+        </p:spPr>
+        <p:txBody>
+          <a:bodyPr wrap="square" rtlCol="0">
+            <a:spAutoFit/>
+          </a:bodyPr>
+          <a:lstStyle/>
+          <a:p>
+            <a:pPr algn="ctr"/>
+            <a:r>
+              <a:rPr lang="en-US" b="1" dirty="0"/>
+              <a:t>Start</a:t>
             </a:r>
           </a:p>
         </p:txBody>

</xml_diff>